<commit_message>
Updated documentation and deleted useless placeholder image.
</commit_message>
<xml_diff>
--- a/doc/Presentation.pptx
+++ b/doc/Presentation.pptx
@@ -6,11 +6,12 @@
   </p:sldMasterIdLst>
   <p:sldIdLst>
     <p:sldId id="256" r:id="rId2"/>
-    <p:sldId id="257" r:id="rId3"/>
-    <p:sldId id="259" r:id="rId4"/>
-    <p:sldId id="258" r:id="rId5"/>
-    <p:sldId id="260" r:id="rId6"/>
-    <p:sldId id="261" r:id="rId7"/>
+    <p:sldId id="262" r:id="rId3"/>
+    <p:sldId id="257" r:id="rId4"/>
+    <p:sldId id="259" r:id="rId5"/>
+    <p:sldId id="258" r:id="rId6"/>
+    <p:sldId id="260" r:id="rId7"/>
+    <p:sldId id="261" r:id="rId8"/>
   </p:sldIdLst>
   <p:sldSz cx="9144000" cy="6858000" type="screen4x3"/>
   <p:notesSz cx="6858000" cy="9144000"/>
@@ -3193,12 +3194,126 @@
           <a:p>
             <a:r>
               <a:rPr lang="fi-FI" dirty="0" smtClean="0"/>
+              <a:t>Welcome</a:t>
+            </a:r>
+            <a:endParaRPr lang="fi-FI" dirty="0"/>
+          </a:p>
+        </p:txBody>
+      </p:sp>
+      <p:sp>
+        <p:nvSpPr>
+          <p:cNvPr id="3" name="Content Placeholder 2"/>
+          <p:cNvSpPr>
+            <a:spLocks noGrp="1"/>
+          </p:cNvSpPr>
+          <p:nvPr>
+            <p:ph idx="1"/>
+          </p:nvPr>
+        </p:nvSpPr>
+        <p:spPr/>
+        <p:txBody>
+          <a:bodyPr>
+            <a:normAutofit/>
+          </a:bodyPr>
+          <a:lstStyle/>
+          <a:p>
+            <a:r>
+              <a:rPr lang="fi-FI" dirty="0" smtClean="0"/>
+              <a:t>What we are going to show you</a:t>
+            </a:r>
+          </a:p>
+          <a:p>
+            <a:pPr lvl="1"/>
+            <a:r>
+              <a:rPr lang="fi-FI" dirty="0" smtClean="0"/>
               <a:t>Goals</a:t>
             </a:r>
+          </a:p>
+          <a:p>
+            <a:pPr lvl="1"/>
+            <a:r>
+              <a:rPr lang="fi-FI" dirty="0" smtClean="0"/>
+              <a:t>What it looks like</a:t>
+            </a:r>
+          </a:p>
+          <a:p>
+            <a:pPr lvl="1"/>
+            <a:r>
+              <a:rPr lang="fi-FI" dirty="0" smtClean="0"/>
+              <a:t>Possible future poblems</a:t>
+            </a:r>
+          </a:p>
+          <a:p>
+            <a:pPr lvl="1"/>
+            <a:r>
+              <a:rPr lang="fi-FI" dirty="0" smtClean="0"/>
+              <a:t>Demo</a:t>
+            </a:r>
+          </a:p>
+          <a:p>
+            <a:pPr marL="0" indent="0">
+              <a:buNone/>
+            </a:pPr>
+            <a:endParaRPr lang="fi-FI" dirty="0" smtClean="0"/>
+          </a:p>
+          <a:p>
             <a:endParaRPr lang="fi-FI" dirty="0"/>
           </a:p>
         </p:txBody>
       </p:sp>
+    </p:spTree>
+    <p:extLst>
+      <p:ext uri="{BB962C8B-B14F-4D97-AF65-F5344CB8AC3E}">
+        <p14:creationId xmlns:p14="http://schemas.microsoft.com/office/powerpoint/2010/main" val="1875525155"/>
+      </p:ext>
+    </p:extLst>
+  </p:cSld>
+  <p:clrMapOvr>
+    <a:masterClrMapping/>
+  </p:clrMapOvr>
+</p:sld>
+</file>
+
+<file path=ppt/slides/slide3.xml><?xml version="1.0" encoding="utf-8"?>
+<p:sld xmlns:a="http://schemas.openxmlformats.org/drawingml/2006/main" xmlns:r="http://schemas.openxmlformats.org/officeDocument/2006/relationships" xmlns:p="http://schemas.openxmlformats.org/presentationml/2006/main">
+  <p:cSld>
+    <p:spTree>
+      <p:nvGrpSpPr>
+        <p:cNvPr id="1" name=""/>
+        <p:cNvGrpSpPr/>
+        <p:nvPr/>
+      </p:nvGrpSpPr>
+      <p:grpSpPr>
+        <a:xfrm>
+          <a:off x="0" y="0"/>
+          <a:ext cx="0" cy="0"/>
+          <a:chOff x="0" y="0"/>
+          <a:chExt cx="0" cy="0"/>
+        </a:xfrm>
+      </p:grpSpPr>
+      <p:sp>
+        <p:nvSpPr>
+          <p:cNvPr id="2" name="Title 1"/>
+          <p:cNvSpPr>
+            <a:spLocks noGrp="1"/>
+          </p:cNvSpPr>
+          <p:nvPr>
+            <p:ph type="title"/>
+          </p:nvPr>
+        </p:nvSpPr>
+        <p:spPr/>
+        <p:txBody>
+          <a:bodyPr/>
+          <a:lstStyle/>
+          <a:p>
+            <a:r>
+              <a:rPr lang="fi-FI" dirty="0" smtClean="0"/>
+              <a:t>Goals</a:t>
+            </a:r>
+            <a:endParaRPr lang="fi-FI" dirty="0"/>
+          </a:p>
+        </p:txBody>
+      </p:sp>
       <p:sp>
         <p:nvSpPr>
           <p:cNvPr id="3" name="Content Placeholder 2"/>
@@ -3216,36 +3331,19 @@
           <a:p>
             <a:r>
               <a:rPr lang="fi-FI" dirty="0" smtClean="0"/>
-              <a:t>Application for sharing and </a:t>
-            </a:r>
+              <a:t>Application for sharing and listing prices for different products</a:t>
+            </a:r>
+          </a:p>
+          <a:p>
             <a:r>
               <a:rPr lang="fi-FI" dirty="0" smtClean="0"/>
-              <a:t>listing prices </a:t>
-            </a:r>
+              <a:t>Users can add products, connect products to shops with prices of the product at that shop</a:t>
+            </a:r>
+          </a:p>
+          <a:p>
             <a:r>
               <a:rPr lang="fi-FI" dirty="0" smtClean="0"/>
-              <a:t>for different products</a:t>
-            </a:r>
-          </a:p>
-          <a:p>
-            <a:r>
-              <a:rPr lang="fi-FI" dirty="0" smtClean="0"/>
-              <a:t>Users can add products, connect products to shops </a:t>
-            </a:r>
-            <a:r>
-              <a:rPr lang="fi-FI" dirty="0" smtClean="0"/>
-              <a:t>with prices of the product at that shop</a:t>
-            </a:r>
-            <a:endParaRPr lang="fi-FI" dirty="0" smtClean="0"/>
-          </a:p>
-          <a:p>
-            <a:r>
-              <a:rPr lang="fi-FI" dirty="0" smtClean="0"/>
-              <a:t>Users can search for </a:t>
-            </a:r>
-            <a:r>
-              <a:rPr lang="fi-FI" dirty="0" smtClean="0"/>
-              <a:t>products and the software will list all the shops it knows of with that product</a:t>
+              <a:t>Users can search for products and the software will list all the shops it knows of with that product</a:t>
             </a:r>
             <a:endParaRPr lang="fi-FI" dirty="0"/>
           </a:p>
@@ -3264,7 +3362,7 @@
 </p:sld>
 </file>
 
-<file path=ppt/slides/slide3.xml><?xml version="1.0" encoding="utf-8"?>
+<file path=ppt/slides/slide4.xml><?xml version="1.0" encoding="utf-8"?>
 <p:sld xmlns:a="http://schemas.openxmlformats.org/drawingml/2006/main" xmlns:r="http://schemas.openxmlformats.org/officeDocument/2006/relationships" xmlns:p="http://schemas.openxmlformats.org/presentationml/2006/main">
   <p:cSld>
     <p:spTree>
@@ -3358,104 +3456,6 @@
 </p:sld>
 </file>
 
-<file path=ppt/slides/slide4.xml><?xml version="1.0" encoding="utf-8"?>
-<p:sld xmlns:a="http://schemas.openxmlformats.org/drawingml/2006/main" xmlns:r="http://schemas.openxmlformats.org/officeDocument/2006/relationships" xmlns:p="http://schemas.openxmlformats.org/presentationml/2006/main">
-  <p:cSld>
-    <p:spTree>
-      <p:nvGrpSpPr>
-        <p:cNvPr id="1" name=""/>
-        <p:cNvGrpSpPr/>
-        <p:nvPr/>
-      </p:nvGrpSpPr>
-      <p:grpSpPr>
-        <a:xfrm>
-          <a:off x="0" y="0"/>
-          <a:ext cx="0" cy="0"/>
-          <a:chOff x="0" y="0"/>
-          <a:chExt cx="0" cy="0"/>
-        </a:xfrm>
-      </p:grpSpPr>
-      <p:sp>
-        <p:nvSpPr>
-          <p:cNvPr id="2" name="Title 1"/>
-          <p:cNvSpPr>
-            <a:spLocks noGrp="1"/>
-          </p:cNvSpPr>
-          <p:nvPr>
-            <p:ph type="title"/>
-          </p:nvPr>
-        </p:nvSpPr>
-        <p:spPr/>
-        <p:txBody>
-          <a:bodyPr/>
-          <a:lstStyle/>
-          <a:p>
-            <a:r>
-              <a:rPr lang="fi-FI" dirty="0" smtClean="0"/>
-              <a:t>Problems</a:t>
-            </a:r>
-            <a:endParaRPr lang="fi-FI" dirty="0"/>
-          </a:p>
-        </p:txBody>
-      </p:sp>
-      <p:sp>
-        <p:nvSpPr>
-          <p:cNvPr id="3" name="Content Placeholder 2"/>
-          <p:cNvSpPr>
-            <a:spLocks noGrp="1"/>
-          </p:cNvSpPr>
-          <p:nvPr>
-            <p:ph idx="1"/>
-          </p:nvPr>
-        </p:nvSpPr>
-        <p:spPr/>
-        <p:txBody>
-          <a:bodyPr/>
-          <a:lstStyle/>
-          <a:p>
-            <a:r>
-              <a:rPr lang="fi-FI" dirty="0" smtClean="0"/>
-              <a:t>Can the user be trusted?</a:t>
-            </a:r>
-          </a:p>
-          <a:p>
-            <a:r>
-              <a:rPr lang="fi-FI" dirty="0" smtClean="0"/>
-              <a:t>How to make the actual </a:t>
-            </a:r>
-            <a:r>
-              <a:rPr lang="fi-FI" dirty="0" smtClean="0"/>
-              <a:t>product widespreadable</a:t>
-            </a:r>
-            <a:endParaRPr lang="fi-FI" dirty="0" smtClean="0"/>
-          </a:p>
-          <a:p>
-            <a:endParaRPr lang="fi-FI" dirty="0" smtClean="0"/>
-          </a:p>
-          <a:p>
-            <a:endParaRPr lang="fi-FI" dirty="0" smtClean="0"/>
-          </a:p>
-          <a:p>
-            <a:endParaRPr lang="fi-FI" dirty="0" smtClean="0"/>
-          </a:p>
-          <a:p>
-            <a:endParaRPr lang="fi-FI" dirty="0"/>
-          </a:p>
-        </p:txBody>
-      </p:sp>
-    </p:spTree>
-    <p:extLst>
-      <p:ext uri="{BB962C8B-B14F-4D97-AF65-F5344CB8AC3E}">
-        <p14:creationId xmlns:p14="http://schemas.microsoft.com/office/powerpoint/2010/main" val="1779234206"/>
-      </p:ext>
-    </p:extLst>
-  </p:cSld>
-  <p:clrMapOvr>
-    <a:masterClrMapping/>
-  </p:clrMapOvr>
-</p:sld>
-</file>
-
 <file path=ppt/slides/slide5.xml><?xml version="1.0" encoding="utf-8"?>
 <p:sld xmlns:a="http://schemas.openxmlformats.org/drawingml/2006/main" xmlns:r="http://schemas.openxmlformats.org/officeDocument/2006/relationships" xmlns:p="http://schemas.openxmlformats.org/presentationml/2006/main">
   <p:cSld>
@@ -3490,6 +3490,99 @@
           <a:p>
             <a:r>
               <a:rPr lang="fi-FI" dirty="0" smtClean="0"/>
+              <a:t>Problems</a:t>
+            </a:r>
+            <a:endParaRPr lang="fi-FI" dirty="0"/>
+          </a:p>
+        </p:txBody>
+      </p:sp>
+      <p:sp>
+        <p:nvSpPr>
+          <p:cNvPr id="3" name="Content Placeholder 2"/>
+          <p:cNvSpPr>
+            <a:spLocks noGrp="1"/>
+          </p:cNvSpPr>
+          <p:nvPr>
+            <p:ph idx="1"/>
+          </p:nvPr>
+        </p:nvSpPr>
+        <p:spPr/>
+        <p:txBody>
+          <a:bodyPr/>
+          <a:lstStyle/>
+          <a:p>
+            <a:r>
+              <a:rPr lang="fi-FI" dirty="0" smtClean="0"/>
+              <a:t>Can the user be trusted?</a:t>
+            </a:r>
+          </a:p>
+          <a:p>
+            <a:r>
+              <a:rPr lang="fi-FI" dirty="0" smtClean="0"/>
+              <a:t>How to make the actual product widespreadable</a:t>
+            </a:r>
+          </a:p>
+          <a:p>
+            <a:endParaRPr lang="fi-FI" dirty="0" smtClean="0"/>
+          </a:p>
+          <a:p>
+            <a:endParaRPr lang="fi-FI" dirty="0" smtClean="0"/>
+          </a:p>
+          <a:p>
+            <a:endParaRPr lang="fi-FI" dirty="0" smtClean="0"/>
+          </a:p>
+          <a:p>
+            <a:endParaRPr lang="fi-FI" dirty="0"/>
+          </a:p>
+        </p:txBody>
+      </p:sp>
+    </p:spTree>
+    <p:extLst>
+      <p:ext uri="{BB962C8B-B14F-4D97-AF65-F5344CB8AC3E}">
+        <p14:creationId xmlns:p14="http://schemas.microsoft.com/office/powerpoint/2010/main" val="1779234206"/>
+      </p:ext>
+    </p:extLst>
+  </p:cSld>
+  <p:clrMapOvr>
+    <a:masterClrMapping/>
+  </p:clrMapOvr>
+</p:sld>
+</file>
+
+<file path=ppt/slides/slide6.xml><?xml version="1.0" encoding="utf-8"?>
+<p:sld xmlns:a="http://schemas.openxmlformats.org/drawingml/2006/main" xmlns:r="http://schemas.openxmlformats.org/officeDocument/2006/relationships" xmlns:p="http://schemas.openxmlformats.org/presentationml/2006/main">
+  <p:cSld>
+    <p:spTree>
+      <p:nvGrpSpPr>
+        <p:cNvPr id="1" name=""/>
+        <p:cNvGrpSpPr/>
+        <p:nvPr/>
+      </p:nvGrpSpPr>
+      <p:grpSpPr>
+        <a:xfrm>
+          <a:off x="0" y="0"/>
+          <a:ext cx="0" cy="0"/>
+          <a:chOff x="0" y="0"/>
+          <a:chExt cx="0" cy="0"/>
+        </a:xfrm>
+      </p:grpSpPr>
+      <p:sp>
+        <p:nvSpPr>
+          <p:cNvPr id="2" name="Title 1"/>
+          <p:cNvSpPr>
+            <a:spLocks noGrp="1"/>
+          </p:cNvSpPr>
+          <p:nvPr>
+            <p:ph type="title"/>
+          </p:nvPr>
+        </p:nvSpPr>
+        <p:spPr/>
+        <p:txBody>
+          <a:bodyPr/>
+          <a:lstStyle/>
+          <a:p>
+            <a:r>
+              <a:rPr lang="fi-FI" dirty="0" smtClean="0"/>
               <a:t>Demo</a:t>
             </a:r>
             <a:endParaRPr lang="fi-FI" dirty="0"/>
@@ -3532,7 +3625,7 @@
 </p:sld>
 </file>
 
-<file path=ppt/slides/slide6.xml><?xml version="1.0" encoding="utf-8"?>
+<file path=ppt/slides/slide7.xml><?xml version="1.0" encoding="utf-8"?>
 <p:sld xmlns:a="http://schemas.openxmlformats.org/drawingml/2006/main" xmlns:r="http://schemas.openxmlformats.org/officeDocument/2006/relationships" xmlns:p="http://schemas.openxmlformats.org/presentationml/2006/main">
   <p:cSld>
     <p:spTree>

</xml_diff>

<commit_message>
Small tweaks on the Presentation
</commit_message>
<xml_diff>
--- a/doc/Presentation.pptx
+++ b/doc/Presentation.pptx
@@ -294,7 +294,7 @@
           <a:p>
             <a:fld id="{FC3820A2-4910-4CA5-B643-B4C92ADE8566}" type="datetimeFigureOut">
               <a:rPr lang="fi-FI" smtClean="0"/>
-              <a:t>7.12.2014</a:t>
+              <a:t>8.12.2014</a:t>
             </a:fld>
             <a:endParaRPr lang="fi-FI"/>
           </a:p>
@@ -464,7 +464,7 @@
           <a:p>
             <a:fld id="{FC3820A2-4910-4CA5-B643-B4C92ADE8566}" type="datetimeFigureOut">
               <a:rPr lang="fi-FI" smtClean="0"/>
-              <a:t>7.12.2014</a:t>
+              <a:t>8.12.2014</a:t>
             </a:fld>
             <a:endParaRPr lang="fi-FI"/>
           </a:p>
@@ -644,7 +644,7 @@
           <a:p>
             <a:fld id="{FC3820A2-4910-4CA5-B643-B4C92ADE8566}" type="datetimeFigureOut">
               <a:rPr lang="fi-FI" smtClean="0"/>
-              <a:t>7.12.2014</a:t>
+              <a:t>8.12.2014</a:t>
             </a:fld>
             <a:endParaRPr lang="fi-FI"/>
           </a:p>
@@ -814,7 +814,7 @@
           <a:p>
             <a:fld id="{FC3820A2-4910-4CA5-B643-B4C92ADE8566}" type="datetimeFigureOut">
               <a:rPr lang="fi-FI" smtClean="0"/>
-              <a:t>7.12.2014</a:t>
+              <a:t>8.12.2014</a:t>
             </a:fld>
             <a:endParaRPr lang="fi-FI"/>
           </a:p>
@@ -1060,7 +1060,7 @@
           <a:p>
             <a:fld id="{FC3820A2-4910-4CA5-B643-B4C92ADE8566}" type="datetimeFigureOut">
               <a:rPr lang="fi-FI" smtClean="0"/>
-              <a:t>7.12.2014</a:t>
+              <a:t>8.12.2014</a:t>
             </a:fld>
             <a:endParaRPr lang="fi-FI"/>
           </a:p>
@@ -1348,7 +1348,7 @@
           <a:p>
             <a:fld id="{FC3820A2-4910-4CA5-B643-B4C92ADE8566}" type="datetimeFigureOut">
               <a:rPr lang="fi-FI" smtClean="0"/>
-              <a:t>7.12.2014</a:t>
+              <a:t>8.12.2014</a:t>
             </a:fld>
             <a:endParaRPr lang="fi-FI"/>
           </a:p>
@@ -1770,7 +1770,7 @@
           <a:p>
             <a:fld id="{FC3820A2-4910-4CA5-B643-B4C92ADE8566}" type="datetimeFigureOut">
               <a:rPr lang="fi-FI" smtClean="0"/>
-              <a:t>7.12.2014</a:t>
+              <a:t>8.12.2014</a:t>
             </a:fld>
             <a:endParaRPr lang="fi-FI"/>
           </a:p>
@@ -1888,7 +1888,7 @@
           <a:p>
             <a:fld id="{FC3820A2-4910-4CA5-B643-B4C92ADE8566}" type="datetimeFigureOut">
               <a:rPr lang="fi-FI" smtClean="0"/>
-              <a:t>7.12.2014</a:t>
+              <a:t>8.12.2014</a:t>
             </a:fld>
             <a:endParaRPr lang="fi-FI"/>
           </a:p>
@@ -1983,7 +1983,7 @@
           <a:p>
             <a:fld id="{FC3820A2-4910-4CA5-B643-B4C92ADE8566}" type="datetimeFigureOut">
               <a:rPr lang="fi-FI" smtClean="0"/>
-              <a:t>7.12.2014</a:t>
+              <a:t>8.12.2014</a:t>
             </a:fld>
             <a:endParaRPr lang="fi-FI"/>
           </a:p>
@@ -2260,7 +2260,7 @@
           <a:p>
             <a:fld id="{FC3820A2-4910-4CA5-B643-B4C92ADE8566}" type="datetimeFigureOut">
               <a:rPr lang="fi-FI" smtClean="0"/>
-              <a:t>7.12.2014</a:t>
+              <a:t>8.12.2014</a:t>
             </a:fld>
             <a:endParaRPr lang="fi-FI"/>
           </a:p>
@@ -2513,7 +2513,7 @@
           <a:p>
             <a:fld id="{FC3820A2-4910-4CA5-B643-B4C92ADE8566}" type="datetimeFigureOut">
               <a:rPr lang="fi-FI" smtClean="0"/>
-              <a:t>7.12.2014</a:t>
+              <a:t>8.12.2014</a:t>
             </a:fld>
             <a:endParaRPr lang="fi-FI"/>
           </a:p>
@@ -2726,7 +2726,7 @@
           <a:p>
             <a:fld id="{FC3820A2-4910-4CA5-B643-B4C92ADE8566}" type="datetimeFigureOut">
               <a:rPr lang="fi-FI" smtClean="0"/>
-              <a:t>7.12.2014</a:t>
+              <a:t>8.12.2014</a:t>
             </a:fld>
             <a:endParaRPr lang="fi-FI"/>
           </a:p>
@@ -3513,14 +3513,28 @@
           <a:p>
             <a:r>
               <a:rPr lang="fi-FI" dirty="0" smtClean="0"/>
-              <a:t>Can the user be trusted?</a:t>
-            </a:r>
-          </a:p>
-          <a:p>
+              <a:t>Can the user be trusted</a:t>
+            </a:r>
             <a:r>
               <a:rPr lang="fi-FI" dirty="0" smtClean="0"/>
-              <a:t>How to make the actual product widespreadable</a:t>
-            </a:r>
+              <a:t>? Or will our application be full of profanity</a:t>
+            </a:r>
+            <a:endParaRPr lang="fi-FI" dirty="0" smtClean="0"/>
+          </a:p>
+          <a:p>
+            <a:r>
+              <a:rPr lang="fi-FI" dirty="0" smtClean="0"/>
+              <a:t>How to make the actual </a:t>
+            </a:r>
+            <a:r>
+              <a:rPr lang="fi-FI" smtClean="0"/>
+              <a:t>product </a:t>
+            </a:r>
+            <a:r>
+              <a:rPr lang="fi-FI" smtClean="0"/>
+              <a:t>widespreadable</a:t>
+            </a:r>
+            <a:endParaRPr lang="fi-FI" dirty="0" smtClean="0"/>
           </a:p>
           <a:p>
             <a:endParaRPr lang="fi-FI" dirty="0" smtClean="0"/>

</xml_diff>

<commit_message>
Updated Documentation.docx and Presentation.pptx
</commit_message>
<xml_diff>
--- a/doc/Presentation.pptx
+++ b/doc/Presentation.pptx
@@ -9,9 +9,10 @@
     <p:sldId id="262" r:id="rId3"/>
     <p:sldId id="257" r:id="rId4"/>
     <p:sldId id="259" r:id="rId5"/>
-    <p:sldId id="258" r:id="rId6"/>
-    <p:sldId id="260" r:id="rId7"/>
-    <p:sldId id="261" r:id="rId8"/>
+    <p:sldId id="263" r:id="rId6"/>
+    <p:sldId id="258" r:id="rId7"/>
+    <p:sldId id="260" r:id="rId8"/>
+    <p:sldId id="261" r:id="rId9"/>
   </p:sldIdLst>
   <p:sldSz cx="9144000" cy="6858000" type="screen4x3"/>
   <p:notesSz cx="6858000" cy="9144000"/>
@@ -110,6 +111,22 @@
       </a:defRPr>
     </a:lvl9pPr>
   </p:defaultTextStyle>
+  <p:extLst>
+    <p:ext uri="{EFAFB233-063F-42B5-8137-9DF3F51BA10A}">
+      <p15:sldGuideLst xmlns:p15="http://schemas.microsoft.com/office/powerpoint/2012/main">
+        <p15:guide id="1" orient="horz" pos="2160">
+          <p15:clr>
+            <a:srgbClr val="A4A3A4"/>
+          </p15:clr>
+        </p15:guide>
+        <p15:guide id="2" pos="2880">
+          <p15:clr>
+            <a:srgbClr val="A4A3A4"/>
+          </p15:clr>
+        </p15:guide>
+      </p15:sldGuideLst>
+    </p:ext>
+  </p:extLst>
 </p:presentation>
 </file>
 
@@ -294,7 +311,7 @@
           <a:p>
             <a:fld id="{FC3820A2-4910-4CA5-B643-B4C92ADE8566}" type="datetimeFigureOut">
               <a:rPr lang="fi-FI" smtClean="0"/>
-              <a:t>8.12.2014</a:t>
+              <a:t>9.12.2014</a:t>
             </a:fld>
             <a:endParaRPr lang="fi-FI"/>
           </a:p>
@@ -464,7 +481,7 @@
           <a:p>
             <a:fld id="{FC3820A2-4910-4CA5-B643-B4C92ADE8566}" type="datetimeFigureOut">
               <a:rPr lang="fi-FI" smtClean="0"/>
-              <a:t>8.12.2014</a:t>
+              <a:t>9.12.2014</a:t>
             </a:fld>
             <a:endParaRPr lang="fi-FI"/>
           </a:p>
@@ -644,7 +661,7 @@
           <a:p>
             <a:fld id="{FC3820A2-4910-4CA5-B643-B4C92ADE8566}" type="datetimeFigureOut">
               <a:rPr lang="fi-FI" smtClean="0"/>
-              <a:t>8.12.2014</a:t>
+              <a:t>9.12.2014</a:t>
             </a:fld>
             <a:endParaRPr lang="fi-FI"/>
           </a:p>
@@ -814,7 +831,7 @@
           <a:p>
             <a:fld id="{FC3820A2-4910-4CA5-B643-B4C92ADE8566}" type="datetimeFigureOut">
               <a:rPr lang="fi-FI" smtClean="0"/>
-              <a:t>8.12.2014</a:t>
+              <a:t>9.12.2014</a:t>
             </a:fld>
             <a:endParaRPr lang="fi-FI"/>
           </a:p>
@@ -1060,7 +1077,7 @@
           <a:p>
             <a:fld id="{FC3820A2-4910-4CA5-B643-B4C92ADE8566}" type="datetimeFigureOut">
               <a:rPr lang="fi-FI" smtClean="0"/>
-              <a:t>8.12.2014</a:t>
+              <a:t>9.12.2014</a:t>
             </a:fld>
             <a:endParaRPr lang="fi-FI"/>
           </a:p>
@@ -1348,7 +1365,7 @@
           <a:p>
             <a:fld id="{FC3820A2-4910-4CA5-B643-B4C92ADE8566}" type="datetimeFigureOut">
               <a:rPr lang="fi-FI" smtClean="0"/>
-              <a:t>8.12.2014</a:t>
+              <a:t>9.12.2014</a:t>
             </a:fld>
             <a:endParaRPr lang="fi-FI"/>
           </a:p>
@@ -1770,7 +1787,7 @@
           <a:p>
             <a:fld id="{FC3820A2-4910-4CA5-B643-B4C92ADE8566}" type="datetimeFigureOut">
               <a:rPr lang="fi-FI" smtClean="0"/>
-              <a:t>8.12.2014</a:t>
+              <a:t>9.12.2014</a:t>
             </a:fld>
             <a:endParaRPr lang="fi-FI"/>
           </a:p>
@@ -1888,7 +1905,7 @@
           <a:p>
             <a:fld id="{FC3820A2-4910-4CA5-B643-B4C92ADE8566}" type="datetimeFigureOut">
               <a:rPr lang="fi-FI" smtClean="0"/>
-              <a:t>8.12.2014</a:t>
+              <a:t>9.12.2014</a:t>
             </a:fld>
             <a:endParaRPr lang="fi-FI"/>
           </a:p>
@@ -1983,7 +2000,7 @@
           <a:p>
             <a:fld id="{FC3820A2-4910-4CA5-B643-B4C92ADE8566}" type="datetimeFigureOut">
               <a:rPr lang="fi-FI" smtClean="0"/>
-              <a:t>8.12.2014</a:t>
+              <a:t>9.12.2014</a:t>
             </a:fld>
             <a:endParaRPr lang="fi-FI"/>
           </a:p>
@@ -2260,7 +2277,7 @@
           <a:p>
             <a:fld id="{FC3820A2-4910-4CA5-B643-B4C92ADE8566}" type="datetimeFigureOut">
               <a:rPr lang="fi-FI" smtClean="0"/>
-              <a:t>8.12.2014</a:t>
+              <a:t>9.12.2014</a:t>
             </a:fld>
             <a:endParaRPr lang="fi-FI"/>
           </a:p>
@@ -2513,7 +2530,7 @@
           <a:p>
             <a:fld id="{FC3820A2-4910-4CA5-B643-B4C92ADE8566}" type="datetimeFigureOut">
               <a:rPr lang="fi-FI" smtClean="0"/>
-              <a:t>8.12.2014</a:t>
+              <a:t>9.12.2014</a:t>
             </a:fld>
             <a:endParaRPr lang="fi-FI"/>
           </a:p>
@@ -2726,7 +2743,7 @@
           <a:p>
             <a:fld id="{FC3820A2-4910-4CA5-B643-B4C92ADE8566}" type="datetimeFigureOut">
               <a:rPr lang="fi-FI" smtClean="0"/>
-              <a:t>8.12.2014</a:t>
+              <a:t>9.12.2014</a:t>
             </a:fld>
             <a:endParaRPr lang="fi-FI"/>
           </a:p>
@@ -3473,87 +3490,40 @@
           <a:chExt cx="0" cy="0"/>
         </a:xfrm>
       </p:grpSpPr>
-      <p:sp>
-        <p:nvSpPr>
-          <p:cNvPr id="2" name="Title 1"/>
-          <p:cNvSpPr>
-            <a:spLocks noGrp="1"/>
-          </p:cNvSpPr>
-          <p:nvPr>
-            <p:ph type="title"/>
-          </p:nvPr>
-        </p:nvSpPr>
-        <p:spPr/>
-        <p:txBody>
-          <a:bodyPr/>
-          <a:lstStyle/>
-          <a:p>
-            <a:r>
-              <a:rPr lang="fi-FI" dirty="0" smtClean="0"/>
-              <a:t>Problems</a:t>
-            </a:r>
-            <a:endParaRPr lang="fi-FI" dirty="0"/>
-          </a:p>
-        </p:txBody>
-      </p:sp>
-      <p:sp>
-        <p:nvSpPr>
-          <p:cNvPr id="3" name="Content Placeholder 2"/>
-          <p:cNvSpPr>
-            <a:spLocks noGrp="1"/>
-          </p:cNvSpPr>
-          <p:nvPr>
-            <p:ph idx="1"/>
-          </p:nvPr>
-        </p:nvSpPr>
-        <p:spPr/>
-        <p:txBody>
-          <a:bodyPr/>
-          <a:lstStyle/>
-          <a:p>
-            <a:r>
-              <a:rPr lang="fi-FI" dirty="0" smtClean="0"/>
-              <a:t>Can the user be trusted</a:t>
-            </a:r>
-            <a:r>
-              <a:rPr lang="fi-FI" dirty="0" smtClean="0"/>
-              <a:t>? Or will our application be full of profanity</a:t>
-            </a:r>
-            <a:endParaRPr lang="fi-FI" dirty="0" smtClean="0"/>
-          </a:p>
-          <a:p>
-            <a:r>
-              <a:rPr lang="fi-FI" dirty="0" smtClean="0"/>
-              <a:t>How to make the actual </a:t>
-            </a:r>
-            <a:r>
-              <a:rPr lang="fi-FI" smtClean="0"/>
-              <a:t>product </a:t>
-            </a:r>
-            <a:r>
-              <a:rPr lang="fi-FI" smtClean="0"/>
-              <a:t>widespreadable</a:t>
-            </a:r>
-            <a:endParaRPr lang="fi-FI" dirty="0" smtClean="0"/>
-          </a:p>
-          <a:p>
-            <a:endParaRPr lang="fi-FI" dirty="0" smtClean="0"/>
-          </a:p>
-          <a:p>
-            <a:endParaRPr lang="fi-FI" dirty="0" smtClean="0"/>
-          </a:p>
-          <a:p>
-            <a:endParaRPr lang="fi-FI" dirty="0" smtClean="0"/>
-          </a:p>
-          <a:p>
-            <a:endParaRPr lang="fi-FI" dirty="0"/>
-          </a:p>
-        </p:txBody>
-      </p:sp>
+      <p:pic>
+        <p:nvPicPr>
+          <p:cNvPr id="2" name="Picture 1"/>
+          <p:cNvPicPr>
+            <a:picLocks noChangeAspect="1"/>
+          </p:cNvPicPr>
+          <p:nvPr/>
+        </p:nvPicPr>
+        <p:blipFill>
+          <a:blip r:embed="rId2">
+            <a:extLst>
+              <a:ext uri="{28A0092B-C50C-407E-A947-70E740481C1C}">
+                <a14:useLocalDpi xmlns:a14="http://schemas.microsoft.com/office/drawing/2010/main" val="0"/>
+              </a:ext>
+            </a:extLst>
+          </a:blip>
+          <a:stretch>
+            <a:fillRect/>
+          </a:stretch>
+        </p:blipFill>
+        <p:spPr>
+          <a:xfrm>
+            <a:off x="247046" y="228153"/>
+            <a:ext cx="8649907" cy="6401693"/>
+          </a:xfrm>
+          <a:prstGeom prst="rect">
+            <a:avLst/>
+          </a:prstGeom>
+        </p:spPr>
+      </p:pic>
     </p:spTree>
     <p:extLst>
       <p:ext uri="{BB962C8B-B14F-4D97-AF65-F5344CB8AC3E}">
-        <p14:creationId xmlns:p14="http://schemas.microsoft.com/office/powerpoint/2010/main" val="1779234206"/>
+        <p14:creationId xmlns:p14="http://schemas.microsoft.com/office/powerpoint/2010/main" val="856546713"/>
       </p:ext>
     </p:extLst>
   </p:cSld>
@@ -3597,6 +3567,104 @@
           <a:p>
             <a:r>
               <a:rPr lang="fi-FI" dirty="0" smtClean="0"/>
+              <a:t>Problems</a:t>
+            </a:r>
+            <a:endParaRPr lang="fi-FI" dirty="0"/>
+          </a:p>
+        </p:txBody>
+      </p:sp>
+      <p:sp>
+        <p:nvSpPr>
+          <p:cNvPr id="3" name="Content Placeholder 2"/>
+          <p:cNvSpPr>
+            <a:spLocks noGrp="1"/>
+          </p:cNvSpPr>
+          <p:nvPr>
+            <p:ph idx="1"/>
+          </p:nvPr>
+        </p:nvSpPr>
+        <p:spPr/>
+        <p:txBody>
+          <a:bodyPr/>
+          <a:lstStyle/>
+          <a:p>
+            <a:r>
+              <a:rPr lang="fi-FI" dirty="0" smtClean="0"/>
+              <a:t>Can the user be trusted? Or will our application be full of profanity</a:t>
+            </a:r>
+          </a:p>
+          <a:p>
+            <a:r>
+              <a:rPr lang="fi-FI" dirty="0" smtClean="0"/>
+              <a:t>How to make the actual </a:t>
+            </a:r>
+            <a:r>
+              <a:rPr lang="fi-FI" smtClean="0"/>
+              <a:t>product widespreadable</a:t>
+            </a:r>
+            <a:endParaRPr lang="fi-FI" dirty="0" smtClean="0"/>
+          </a:p>
+          <a:p>
+            <a:endParaRPr lang="fi-FI" dirty="0" smtClean="0"/>
+          </a:p>
+          <a:p>
+            <a:endParaRPr lang="fi-FI" dirty="0" smtClean="0"/>
+          </a:p>
+          <a:p>
+            <a:endParaRPr lang="fi-FI" dirty="0" smtClean="0"/>
+          </a:p>
+          <a:p>
+            <a:endParaRPr lang="fi-FI" dirty="0"/>
+          </a:p>
+        </p:txBody>
+      </p:sp>
+    </p:spTree>
+    <p:extLst>
+      <p:ext uri="{BB962C8B-B14F-4D97-AF65-F5344CB8AC3E}">
+        <p14:creationId xmlns:p14="http://schemas.microsoft.com/office/powerpoint/2010/main" val="1779234206"/>
+      </p:ext>
+    </p:extLst>
+  </p:cSld>
+  <p:clrMapOvr>
+    <a:masterClrMapping/>
+  </p:clrMapOvr>
+</p:sld>
+</file>
+
+<file path=ppt/slides/slide7.xml><?xml version="1.0" encoding="utf-8"?>
+<p:sld xmlns:a="http://schemas.openxmlformats.org/drawingml/2006/main" xmlns:r="http://schemas.openxmlformats.org/officeDocument/2006/relationships" xmlns:p="http://schemas.openxmlformats.org/presentationml/2006/main">
+  <p:cSld>
+    <p:spTree>
+      <p:nvGrpSpPr>
+        <p:cNvPr id="1" name=""/>
+        <p:cNvGrpSpPr/>
+        <p:nvPr/>
+      </p:nvGrpSpPr>
+      <p:grpSpPr>
+        <a:xfrm>
+          <a:off x="0" y="0"/>
+          <a:ext cx="0" cy="0"/>
+          <a:chOff x="0" y="0"/>
+          <a:chExt cx="0" cy="0"/>
+        </a:xfrm>
+      </p:grpSpPr>
+      <p:sp>
+        <p:nvSpPr>
+          <p:cNvPr id="2" name="Title 1"/>
+          <p:cNvSpPr>
+            <a:spLocks noGrp="1"/>
+          </p:cNvSpPr>
+          <p:nvPr>
+            <p:ph type="title"/>
+          </p:nvPr>
+        </p:nvSpPr>
+        <p:spPr/>
+        <p:txBody>
+          <a:bodyPr/>
+          <a:lstStyle/>
+          <a:p>
+            <a:r>
+              <a:rPr lang="fi-FI" dirty="0" smtClean="0"/>
               <a:t>Demo</a:t>
             </a:r>
             <a:endParaRPr lang="fi-FI" dirty="0"/>
@@ -3639,7 +3707,7 @@
 </p:sld>
 </file>
 
-<file path=ppt/slides/slide7.xml><?xml version="1.0" encoding="utf-8"?>
+<file path=ppt/slides/slide8.xml><?xml version="1.0" encoding="utf-8"?>
 <p:sld xmlns:a="http://schemas.openxmlformats.org/drawingml/2006/main" xmlns:r="http://schemas.openxmlformats.org/officeDocument/2006/relationships" xmlns:p="http://schemas.openxmlformats.org/presentationml/2006/main">
   <p:cSld>
     <p:spTree>

</xml_diff>